<commit_message>
feat: content_type / presentation 解析
</commit_message>
<xml_diff>
--- a/assets/ppt/simple.pptx
+++ b/assets/ppt/simple.pptx
@@ -105,6 +105,11 @@
       </a:defRPr>
     </a:lvl9pPr>
   </p:defaultTextStyle>
+  <p:extLst>
+    <p:ext uri="{EFAFB233-063F-42B5-8137-9DF3F51BA10A}">
+      <p15:sldGuideLst xmlns:p15="http://schemas.microsoft.com/office/powerpoint/2012/main"/>
+    </p:ext>
+  </p:extLst>
 </p:presentation>
 </file>
 
@@ -255,7 +260,7 @@
           <a:p>
             <a:fld id="{8824DD16-84C3-49D6-AC01-26B8500D478E}" type="datetimeFigureOut">
               <a:rPr lang="zh-CN" altLang="en-US" smtClean="0"/>
-              <a:t>2024/2/26</a:t>
+              <a:t>2024/3/21</a:t>
             </a:fld>
             <a:endParaRPr lang="zh-CN" altLang="en-US"/>
           </a:p>
@@ -453,7 +458,7 @@
           <a:p>
             <a:fld id="{8824DD16-84C3-49D6-AC01-26B8500D478E}" type="datetimeFigureOut">
               <a:rPr lang="zh-CN" altLang="en-US" smtClean="0"/>
-              <a:t>2024/2/26</a:t>
+              <a:t>2024/3/21</a:t>
             </a:fld>
             <a:endParaRPr lang="zh-CN" altLang="en-US"/>
           </a:p>
@@ -661,7 +666,7 @@
           <a:p>
             <a:fld id="{8824DD16-84C3-49D6-AC01-26B8500D478E}" type="datetimeFigureOut">
               <a:rPr lang="zh-CN" altLang="en-US" smtClean="0"/>
-              <a:t>2024/2/26</a:t>
+              <a:t>2024/3/21</a:t>
             </a:fld>
             <a:endParaRPr lang="zh-CN" altLang="en-US"/>
           </a:p>
@@ -859,7 +864,7 @@
           <a:p>
             <a:fld id="{8824DD16-84C3-49D6-AC01-26B8500D478E}" type="datetimeFigureOut">
               <a:rPr lang="zh-CN" altLang="en-US" smtClean="0"/>
-              <a:t>2024/2/26</a:t>
+              <a:t>2024/3/21</a:t>
             </a:fld>
             <a:endParaRPr lang="zh-CN" altLang="en-US"/>
           </a:p>
@@ -1134,7 +1139,7 @@
           <a:p>
             <a:fld id="{8824DD16-84C3-49D6-AC01-26B8500D478E}" type="datetimeFigureOut">
               <a:rPr lang="zh-CN" altLang="en-US" smtClean="0"/>
-              <a:t>2024/2/26</a:t>
+              <a:t>2024/3/21</a:t>
             </a:fld>
             <a:endParaRPr lang="zh-CN" altLang="en-US"/>
           </a:p>
@@ -1399,7 +1404,7 @@
           <a:p>
             <a:fld id="{8824DD16-84C3-49D6-AC01-26B8500D478E}" type="datetimeFigureOut">
               <a:rPr lang="zh-CN" altLang="en-US" smtClean="0"/>
-              <a:t>2024/2/26</a:t>
+              <a:t>2024/3/21</a:t>
             </a:fld>
             <a:endParaRPr lang="zh-CN" altLang="en-US"/>
           </a:p>
@@ -1811,7 +1816,7 @@
           <a:p>
             <a:fld id="{8824DD16-84C3-49D6-AC01-26B8500D478E}" type="datetimeFigureOut">
               <a:rPr lang="zh-CN" altLang="en-US" smtClean="0"/>
-              <a:t>2024/2/26</a:t>
+              <a:t>2024/3/21</a:t>
             </a:fld>
             <a:endParaRPr lang="zh-CN" altLang="en-US"/>
           </a:p>
@@ -1952,7 +1957,7 @@
           <a:p>
             <a:fld id="{8824DD16-84C3-49D6-AC01-26B8500D478E}" type="datetimeFigureOut">
               <a:rPr lang="zh-CN" altLang="en-US" smtClean="0"/>
-              <a:t>2024/2/26</a:t>
+              <a:t>2024/3/21</a:t>
             </a:fld>
             <a:endParaRPr lang="zh-CN" altLang="en-US"/>
           </a:p>
@@ -2065,7 +2070,7 @@
           <a:p>
             <a:fld id="{8824DD16-84C3-49D6-AC01-26B8500D478E}" type="datetimeFigureOut">
               <a:rPr lang="zh-CN" altLang="en-US" smtClean="0"/>
-              <a:t>2024/2/26</a:t>
+              <a:t>2024/3/21</a:t>
             </a:fld>
             <a:endParaRPr lang="zh-CN" altLang="en-US"/>
           </a:p>
@@ -2376,7 +2381,7 @@
           <a:p>
             <a:fld id="{8824DD16-84C3-49D6-AC01-26B8500D478E}" type="datetimeFigureOut">
               <a:rPr lang="zh-CN" altLang="en-US" smtClean="0"/>
-              <a:t>2024/2/26</a:t>
+              <a:t>2024/3/21</a:t>
             </a:fld>
             <a:endParaRPr lang="zh-CN" altLang="en-US"/>
           </a:p>
@@ -2664,7 +2669,7 @@
           <a:p>
             <a:fld id="{8824DD16-84C3-49D6-AC01-26B8500D478E}" type="datetimeFigureOut">
               <a:rPr lang="zh-CN" altLang="en-US" smtClean="0"/>
-              <a:t>2024/2/26</a:t>
+              <a:t>2024/3/21</a:t>
             </a:fld>
             <a:endParaRPr lang="zh-CN" altLang="en-US"/>
           </a:p>
@@ -2905,7 +2910,7 @@
           <a:p>
             <a:fld id="{8824DD16-84C3-49D6-AC01-26B8500D478E}" type="datetimeFigureOut">
               <a:rPr lang="zh-CN" altLang="en-US" smtClean="0"/>
-              <a:t>2024/2/26</a:t>
+              <a:t>2024/3/21</a:t>
             </a:fld>
             <a:endParaRPr lang="zh-CN" altLang="en-US"/>
           </a:p>
@@ -3324,10 +3329,168 @@
       </p:grpSpPr>
       <p:sp>
         <p:nvSpPr>
-          <p:cNvPr id="4" name="文本框 3">
-            <a:extLst>
-              <a:ext uri="{FF2B5EF4-FFF2-40B4-BE49-F238E27FC236}">
-                <a16:creationId xmlns:a16="http://schemas.microsoft.com/office/drawing/2014/main" id="{81ADFB5F-A502-5F7C-2F09-BCDBB90D6070}"/>
+          <p:cNvPr id="2" name="矩形 1">
+            <a:extLst>
+              <a:ext uri="{FF2B5EF4-FFF2-40B4-BE49-F238E27FC236}">
+                <a16:creationId xmlns:a16="http://schemas.microsoft.com/office/drawing/2014/main" id="{FA50808A-F6E6-C799-A813-2A4025701E06}"/>
+              </a:ext>
+            </a:extLst>
+          </p:cNvPr>
+          <p:cNvSpPr/>
+          <p:nvPr/>
+        </p:nvSpPr>
+        <p:spPr>
+          <a:xfrm flipV="1">
+            <a:off x="462844" y="530578"/>
+            <a:ext cx="2280356" cy="1320800"/>
+          </a:xfrm>
+          <a:prstGeom prst="rect">
+            <a:avLst/>
+          </a:prstGeom>
+          <a:gradFill>
+            <a:gsLst>
+              <a:gs pos="0">
+                <a:schemeClr val="accent1">
+                  <a:lumMod val="5000"/>
+                  <a:lumOff val="95000"/>
+                </a:schemeClr>
+              </a:gs>
+              <a:gs pos="53000">
+                <a:schemeClr val="accent4">
+                  <a:lumMod val="75000"/>
+                </a:schemeClr>
+              </a:gs>
+              <a:gs pos="83000">
+                <a:schemeClr val="accent1">
+                  <a:lumMod val="45000"/>
+                  <a:lumOff val="55000"/>
+                </a:schemeClr>
+              </a:gs>
+              <a:gs pos="100000">
+                <a:schemeClr val="accent1">
+                  <a:lumMod val="30000"/>
+                  <a:lumOff val="70000"/>
+                </a:schemeClr>
+              </a:gs>
+            </a:gsLst>
+            <a:lin ang="5400000" scaled="1"/>
+          </a:gradFill>
+        </p:spPr>
+        <p:style>
+          <a:lnRef idx="2">
+            <a:schemeClr val="accent1">
+              <a:shade val="15000"/>
+            </a:schemeClr>
+          </a:lnRef>
+          <a:fillRef idx="1">
+            <a:schemeClr val="accent1"/>
+          </a:fillRef>
+          <a:effectRef idx="0">
+            <a:schemeClr val="accent1"/>
+          </a:effectRef>
+          <a:fontRef idx="minor">
+            <a:schemeClr val="lt1"/>
+          </a:fontRef>
+        </p:style>
+        <p:txBody>
+          <a:bodyPr rtlCol="0" anchor="ctr"/>
+          <a:lstStyle/>
+          <a:p>
+            <a:pPr algn="ctr"/>
+            <a:endParaRPr lang="zh-CN" altLang="en-US"/>
+          </a:p>
+        </p:txBody>
+      </p:sp>
+      <p:sp>
+        <p:nvSpPr>
+          <p:cNvPr id="3" name="等腰三角形 2">
+            <a:extLst>
+              <a:ext uri="{FF2B5EF4-FFF2-40B4-BE49-F238E27FC236}">
+                <a16:creationId xmlns:a16="http://schemas.microsoft.com/office/drawing/2014/main" id="{D887D799-7F29-15F7-E8F2-9E9B64BED654}"/>
+              </a:ext>
+            </a:extLst>
+          </p:cNvPr>
+          <p:cNvSpPr/>
+          <p:nvPr/>
+        </p:nvSpPr>
+        <p:spPr>
+          <a:xfrm>
+            <a:off x="3770488" y="530578"/>
+            <a:ext cx="1219201" cy="1320800"/>
+          </a:xfrm>
+          <a:prstGeom prst="triangle">
+            <a:avLst>
+              <a:gd name="adj" fmla="val 0"/>
+            </a:avLst>
+          </a:prstGeom>
+        </p:spPr>
+        <p:style>
+          <a:lnRef idx="2">
+            <a:schemeClr val="accent1">
+              <a:shade val="15000"/>
+            </a:schemeClr>
+          </a:lnRef>
+          <a:fillRef idx="1">
+            <a:schemeClr val="accent1"/>
+          </a:fillRef>
+          <a:effectRef idx="0">
+            <a:schemeClr val="accent1"/>
+          </a:effectRef>
+          <a:fontRef idx="minor">
+            <a:schemeClr val="lt1"/>
+          </a:fontRef>
+        </p:style>
+        <p:txBody>
+          <a:bodyPr rtlCol="0" anchor="ctr"/>
+          <a:lstStyle/>
+          <a:p>
+            <a:pPr algn="ctr"/>
+            <a:endParaRPr lang="zh-CN" altLang="en-US"/>
+          </a:p>
+        </p:txBody>
+      </p:sp>
+      <p:pic>
+        <p:nvPicPr>
+          <p:cNvPr id="6" name="图片 5">
+            <a:extLst>
+              <a:ext uri="{FF2B5EF4-FFF2-40B4-BE49-F238E27FC236}">
+                <a16:creationId xmlns:a16="http://schemas.microsoft.com/office/drawing/2014/main" id="{813E5E03-13DF-027D-4362-4CBEDC0F64D3}"/>
+              </a:ext>
+            </a:extLst>
+          </p:cNvPr>
+          <p:cNvPicPr>
+            <a:picLocks noChangeAspect="1"/>
+          </p:cNvPicPr>
+          <p:nvPr/>
+        </p:nvPicPr>
+        <p:blipFill>
+          <a:blip r:embed="rId2">
+            <a:extLst>
+              <a:ext uri="{28A0092B-C50C-407E-A947-70E740481C1C}">
+                <a14:useLocalDpi xmlns:a14="http://schemas.microsoft.com/office/drawing/2010/main" val="0"/>
+              </a:ext>
+            </a:extLst>
+          </a:blip>
+          <a:stretch>
+            <a:fillRect/>
+          </a:stretch>
+        </p:blipFill>
+        <p:spPr>
+          <a:xfrm>
+            <a:off x="5754439" y="581603"/>
+            <a:ext cx="3210927" cy="1269775"/>
+          </a:xfrm>
+          <a:prstGeom prst="rect">
+            <a:avLst/>
+          </a:prstGeom>
+        </p:spPr>
+      </p:pic>
+      <p:sp>
+        <p:nvSpPr>
+          <p:cNvPr id="7" name="文本框 6">
+            <a:extLst>
+              <a:ext uri="{FF2B5EF4-FFF2-40B4-BE49-F238E27FC236}">
+                <a16:creationId xmlns:a16="http://schemas.microsoft.com/office/drawing/2014/main" id="{3B6AEB22-FC25-3571-9BF6-832D408159D6}"/>
               </a:ext>
             </a:extLst>
           </p:cNvPr>
@@ -3336,8 +3499,8 @@
         </p:nvSpPr>
         <p:spPr>
           <a:xfrm>
-            <a:off x="3019586" y="2921168"/>
-            <a:ext cx="6152828" cy="1015663"/>
+            <a:off x="462844" y="2692358"/>
+            <a:ext cx="2743200" cy="646331"/>
           </a:xfrm>
           <a:prstGeom prst="rect">
             <a:avLst/>
@@ -3351,19 +3514,204 @@
           <a:lstStyle/>
           <a:p>
             <a:r>
-              <a:rPr lang="en-US" altLang="zh-CN" sz="6000" dirty="0">
-                <a:latin typeface="851CHIKARA-YOWAKU" panose="02000600000000000000" pitchFamily="2" charset="-128"/>
-                <a:ea typeface="851CHIKARA-YOWAKU" panose="02000600000000000000" pitchFamily="2" charset="-128"/>
-              </a:rPr>
-              <a:t>HELLO WORLD!</a:t>
-            </a:r>
-            <a:endParaRPr lang="zh-CN" altLang="en-US" sz="6000" dirty="0">
-              <a:latin typeface="851CHIKARA-YOWAKU" panose="02000600000000000000" pitchFamily="2" charset="-128"/>
-              <a:ea typeface="851CHIKARA-YOWAKU" panose="02000600000000000000" pitchFamily="2" charset="-128"/>
-            </a:endParaRPr>
-          </a:p>
-        </p:txBody>
-      </p:sp>
+              <a:rPr lang="en-US" altLang="zh-CN" sz="3600" dirty="0"/>
+              <a:t>FONTSIZE36</a:t>
+            </a:r>
+            <a:endParaRPr lang="zh-CN" altLang="en-US" sz="3600" dirty="0"/>
+          </a:p>
+        </p:txBody>
+      </p:sp>
+      <p:sp>
+        <p:nvSpPr>
+          <p:cNvPr id="8" name="文本框 7">
+            <a:extLst>
+              <a:ext uri="{FF2B5EF4-FFF2-40B4-BE49-F238E27FC236}">
+                <a16:creationId xmlns:a16="http://schemas.microsoft.com/office/drawing/2014/main" id="{48EC1386-EC7F-8EB9-A95B-DA28B38340DC}"/>
+              </a:ext>
+            </a:extLst>
+          </p:cNvPr>
+          <p:cNvSpPr txBox="1"/>
+          <p:nvPr/>
+        </p:nvSpPr>
+        <p:spPr>
+          <a:xfrm>
+            <a:off x="587022" y="3951111"/>
+            <a:ext cx="2095445" cy="369332"/>
+          </a:xfrm>
+          <a:prstGeom prst="rect">
+            <a:avLst/>
+          </a:prstGeom>
+          <a:noFill/>
+        </p:spPr>
+        <p:txBody>
+          <a:bodyPr wrap="none" rtlCol="0">
+            <a:spAutoFit/>
+          </a:bodyPr>
+          <a:lstStyle/>
+          <a:p>
+            <a:r>
+              <a:rPr lang="en-US" altLang="zh-CN" dirty="0"/>
+              <a:t>FONTSIZEDEFAULT</a:t>
+            </a:r>
+            <a:endParaRPr lang="zh-CN" altLang="en-US" dirty="0"/>
+          </a:p>
+        </p:txBody>
+      </p:sp>
+      <p:cxnSp>
+        <p:nvCxnSpPr>
+          <p:cNvPr id="10" name="直接连接符 9">
+            <a:extLst>
+              <a:ext uri="{FF2B5EF4-FFF2-40B4-BE49-F238E27FC236}">
+                <a16:creationId xmlns:a16="http://schemas.microsoft.com/office/drawing/2014/main" id="{B45AF8EE-211D-97DC-9BEE-D8783FCAC5BB}"/>
+              </a:ext>
+            </a:extLst>
+          </p:cNvPr>
+          <p:cNvCxnSpPr/>
+          <p:nvPr/>
+        </p:nvCxnSpPr>
+        <p:spPr>
+          <a:xfrm>
+            <a:off x="3770488" y="2856089"/>
+            <a:ext cx="1219201" cy="1464354"/>
+          </a:xfrm>
+          <a:prstGeom prst="line">
+            <a:avLst/>
+          </a:prstGeom>
+        </p:spPr>
+        <p:style>
+          <a:lnRef idx="1">
+            <a:schemeClr val="accent1"/>
+          </a:lnRef>
+          <a:fillRef idx="0">
+            <a:schemeClr val="accent1"/>
+          </a:fillRef>
+          <a:effectRef idx="0">
+            <a:schemeClr val="accent1"/>
+          </a:effectRef>
+          <a:fontRef idx="minor">
+            <a:schemeClr val="tx1"/>
+          </a:fontRef>
+        </p:style>
+      </p:cxnSp>
+      <p:grpSp>
+        <p:nvGrpSpPr>
+          <p:cNvPr id="13" name="组合 12">
+            <a:extLst>
+              <a:ext uri="{FF2B5EF4-FFF2-40B4-BE49-F238E27FC236}">
+                <a16:creationId xmlns:a16="http://schemas.microsoft.com/office/drawing/2014/main" id="{F4A43CD4-55B3-04D0-5B12-F3F9CEF53165}"/>
+              </a:ext>
+            </a:extLst>
+          </p:cNvPr>
+          <p:cNvGrpSpPr/>
+          <p:nvPr/>
+        </p:nvGrpSpPr>
+        <p:grpSpPr>
+          <a:xfrm>
+            <a:off x="6456791" y="3369733"/>
+            <a:ext cx="1978873" cy="646331"/>
+            <a:chOff x="7359902" y="3338689"/>
+            <a:chExt cx="1978873" cy="646331"/>
+          </a:xfrm>
+        </p:grpSpPr>
+        <p:sp>
+          <p:nvSpPr>
+            <p:cNvPr id="11" name="椭圆 10">
+              <a:extLst>
+                <a:ext uri="{FF2B5EF4-FFF2-40B4-BE49-F238E27FC236}">
+                  <a16:creationId xmlns:a16="http://schemas.microsoft.com/office/drawing/2014/main" id="{F5691CE3-A633-C321-5BF8-40E3A6FA91CB}"/>
+                </a:ext>
+              </a:extLst>
+            </p:cNvPr>
+            <p:cNvSpPr/>
+            <p:nvPr/>
+          </p:nvSpPr>
+          <p:spPr>
+            <a:xfrm>
+              <a:off x="7359902" y="3338689"/>
+              <a:ext cx="646331" cy="646331"/>
+            </a:xfrm>
+            <a:prstGeom prst="ellipse">
+              <a:avLst/>
+            </a:prstGeom>
+          </p:spPr>
+          <p:style>
+            <a:lnRef idx="2">
+              <a:schemeClr val="accent1">
+                <a:shade val="15000"/>
+              </a:schemeClr>
+            </a:lnRef>
+            <a:fillRef idx="1">
+              <a:schemeClr val="accent1"/>
+            </a:fillRef>
+            <a:effectRef idx="0">
+              <a:schemeClr val="accent1"/>
+            </a:effectRef>
+            <a:fontRef idx="minor">
+              <a:schemeClr val="lt1"/>
+            </a:fontRef>
+          </p:style>
+          <p:txBody>
+            <a:bodyPr rtlCol="0" anchor="ctr"/>
+            <a:lstStyle/>
+            <a:p>
+              <a:pPr algn="ctr"/>
+              <a:r>
+                <a:rPr lang="zh-CN" altLang="en-US" dirty="0"/>
+                <a:t>组</a:t>
+              </a:r>
+            </a:p>
+          </p:txBody>
+        </p:sp>
+        <p:sp>
+          <p:nvSpPr>
+            <p:cNvPr id="12" name="椭圆 11">
+              <a:extLst>
+                <a:ext uri="{FF2B5EF4-FFF2-40B4-BE49-F238E27FC236}">
+                  <a16:creationId xmlns:a16="http://schemas.microsoft.com/office/drawing/2014/main" id="{B925589A-9CC2-EAC5-3F44-24074C6CE4B5}"/>
+                </a:ext>
+              </a:extLst>
+            </p:cNvPr>
+            <p:cNvSpPr/>
+            <p:nvPr/>
+          </p:nvSpPr>
+          <p:spPr>
+            <a:xfrm>
+              <a:off x="8692444" y="3338689"/>
+              <a:ext cx="646331" cy="646331"/>
+            </a:xfrm>
+            <a:prstGeom prst="ellipse">
+              <a:avLst/>
+            </a:prstGeom>
+          </p:spPr>
+          <p:style>
+            <a:lnRef idx="2">
+              <a:schemeClr val="accent1">
+                <a:shade val="15000"/>
+              </a:schemeClr>
+            </a:lnRef>
+            <a:fillRef idx="1">
+              <a:schemeClr val="accent1"/>
+            </a:fillRef>
+            <a:effectRef idx="0">
+              <a:schemeClr val="accent1"/>
+            </a:effectRef>
+            <a:fontRef idx="minor">
+              <a:schemeClr val="lt1"/>
+            </a:fontRef>
+          </p:style>
+          <p:txBody>
+            <a:bodyPr rtlCol="0" anchor="ctr"/>
+            <a:lstStyle/>
+            <a:p>
+              <a:pPr algn="ctr"/>
+              <a:r>
+                <a:rPr lang="zh-CN" altLang="en-US" dirty="0"/>
+                <a:t>合</a:t>
+              </a:r>
+            </a:p>
+          </p:txBody>
+        </p:sp>
+      </p:grpSp>
     </p:spTree>
     <p:extLst>
       <p:ext uri="{BB962C8B-B14F-4D97-AF65-F5344CB8AC3E}">
@@ -3380,6 +3728,14 @@
 <file path=ppt/slides/slide2.xml><?xml version="1.0" encoding="utf-8"?>
 <p:sld xmlns:a="http://schemas.openxmlformats.org/drawingml/2006/main" xmlns:r="http://schemas.openxmlformats.org/officeDocument/2006/relationships" xmlns:p="http://schemas.openxmlformats.org/presentationml/2006/main">
   <p:cSld>
+    <p:bg>
+      <p:bgPr>
+        <a:solidFill>
+          <a:schemeClr val="tx1"/>
+        </a:solidFill>
+        <a:effectLst/>
+      </p:bgPr>
+    </p:bg>
     <p:spTree>
       <p:nvGrpSpPr>
         <p:cNvPr id="1" name=""/>
@@ -3396,10 +3752,10 @@
       </p:grpSpPr>
       <p:sp>
         <p:nvSpPr>
-          <p:cNvPr id="4" name="等腰三角形 3">
-            <a:extLst>
-              <a:ext uri="{FF2B5EF4-FFF2-40B4-BE49-F238E27FC236}">
-                <a16:creationId xmlns:a16="http://schemas.microsoft.com/office/drawing/2014/main" id="{DB4F5DDE-B08D-317D-3885-7F3491B3DC43}"/>
+          <p:cNvPr id="2" name="矩形 1">
+            <a:extLst>
+              <a:ext uri="{FF2B5EF4-FFF2-40B4-BE49-F238E27FC236}">
+                <a16:creationId xmlns:a16="http://schemas.microsoft.com/office/drawing/2014/main" id="{CF4CF876-8FE4-1B52-7235-9BAC5B9C0689}"/>
               </a:ext>
             </a:extLst>
           </p:cNvPr>
@@ -3408,10 +3764,336 @@
         </p:nvSpPr>
         <p:spPr>
           <a:xfrm>
-            <a:off x="4127715" y="1522708"/>
-            <a:ext cx="3936569" cy="3812583"/>
+            <a:off x="447758" y="487177"/>
+            <a:ext cx="1873956" cy="2573867"/>
           </a:xfrm>
-          <a:prstGeom prst="triangle">
+          <a:prstGeom prst="rect">
+            <a:avLst/>
+          </a:prstGeom>
+        </p:spPr>
+        <p:style>
+          <a:lnRef idx="2">
+            <a:schemeClr val="accent1">
+              <a:shade val="15000"/>
+            </a:schemeClr>
+          </a:lnRef>
+          <a:fillRef idx="1">
+            <a:schemeClr val="accent1"/>
+          </a:fillRef>
+          <a:effectRef idx="0">
+            <a:schemeClr val="accent1"/>
+          </a:effectRef>
+          <a:fontRef idx="minor">
+            <a:schemeClr val="lt1"/>
+          </a:fontRef>
+        </p:style>
+        <p:txBody>
+          <a:bodyPr rtlCol="0" anchor="ctr"/>
+          <a:lstStyle/>
+          <a:p>
+            <a:pPr algn="ctr"/>
+            <a:endParaRPr lang="zh-CN" altLang="en-US"/>
+          </a:p>
+        </p:txBody>
+      </p:sp>
+      <p:sp>
+        <p:nvSpPr>
+          <p:cNvPr id="3" name="矩形 2">
+            <a:extLst>
+              <a:ext uri="{FF2B5EF4-FFF2-40B4-BE49-F238E27FC236}">
+                <a16:creationId xmlns:a16="http://schemas.microsoft.com/office/drawing/2014/main" id="{9058BA7B-B563-B4DE-2C8D-CA62B9CBD09C}"/>
+              </a:ext>
+            </a:extLst>
+          </p:cNvPr>
+          <p:cNvSpPr/>
+          <p:nvPr/>
+        </p:nvSpPr>
+        <p:spPr>
+          <a:xfrm>
+            <a:off x="2812782" y="487178"/>
+            <a:ext cx="1873956" cy="2573867"/>
+          </a:xfrm>
+          <a:prstGeom prst="rect">
+            <a:avLst/>
+          </a:prstGeom>
+          <a:solidFill>
+            <a:srgbClr val="FD0B0B"/>
+          </a:solidFill>
+        </p:spPr>
+        <p:style>
+          <a:lnRef idx="2">
+            <a:schemeClr val="accent1">
+              <a:shade val="15000"/>
+            </a:schemeClr>
+          </a:lnRef>
+          <a:fillRef idx="1">
+            <a:schemeClr val="accent1"/>
+          </a:fillRef>
+          <a:effectRef idx="0">
+            <a:schemeClr val="accent1"/>
+          </a:effectRef>
+          <a:fontRef idx="minor">
+            <a:schemeClr val="lt1"/>
+          </a:fontRef>
+        </p:style>
+        <p:txBody>
+          <a:bodyPr rtlCol="0" anchor="ctr"/>
+          <a:lstStyle/>
+          <a:p>
+            <a:pPr algn="ctr"/>
+            <a:endParaRPr lang="zh-CN" altLang="en-US"/>
+          </a:p>
+        </p:txBody>
+      </p:sp>
+      <p:sp>
+        <p:nvSpPr>
+          <p:cNvPr id="4" name="矩形 3">
+            <a:extLst>
+              <a:ext uri="{FF2B5EF4-FFF2-40B4-BE49-F238E27FC236}">
+                <a16:creationId xmlns:a16="http://schemas.microsoft.com/office/drawing/2014/main" id="{06ED6720-AC82-BDC3-1C2C-F71AC312E9A9}"/>
+              </a:ext>
+            </a:extLst>
+          </p:cNvPr>
+          <p:cNvSpPr/>
+          <p:nvPr/>
+        </p:nvSpPr>
+        <p:spPr>
+          <a:xfrm>
+            <a:off x="5177805" y="487177"/>
+            <a:ext cx="1873956" cy="2573867"/>
+          </a:xfrm>
+          <a:prstGeom prst="rect">
+            <a:avLst/>
+          </a:prstGeom>
+          <a:gradFill>
+            <a:gsLst>
+              <a:gs pos="0">
+                <a:schemeClr val="accent1">
+                  <a:lumMod val="5000"/>
+                  <a:lumOff val="95000"/>
+                </a:schemeClr>
+              </a:gs>
+              <a:gs pos="39000">
+                <a:schemeClr val="accent1">
+                  <a:lumMod val="45000"/>
+                  <a:lumOff val="55000"/>
+                </a:schemeClr>
+              </a:gs>
+              <a:gs pos="83000">
+                <a:schemeClr val="accent1">
+                  <a:lumMod val="45000"/>
+                  <a:lumOff val="55000"/>
+                </a:schemeClr>
+              </a:gs>
+              <a:gs pos="100000">
+                <a:schemeClr val="accent1">
+                  <a:lumMod val="30000"/>
+                  <a:lumOff val="70000"/>
+                </a:schemeClr>
+              </a:gs>
+            </a:gsLst>
+            <a:lin ang="5400000" scaled="1"/>
+          </a:gradFill>
+        </p:spPr>
+        <p:style>
+          <a:lnRef idx="2">
+            <a:schemeClr val="accent1">
+              <a:shade val="15000"/>
+            </a:schemeClr>
+          </a:lnRef>
+          <a:fillRef idx="1">
+            <a:schemeClr val="accent1"/>
+          </a:fillRef>
+          <a:effectRef idx="0">
+            <a:schemeClr val="accent1"/>
+          </a:effectRef>
+          <a:fontRef idx="minor">
+            <a:schemeClr val="lt1"/>
+          </a:fontRef>
+        </p:style>
+        <p:txBody>
+          <a:bodyPr rtlCol="0" anchor="ctr"/>
+          <a:lstStyle/>
+          <a:p>
+            <a:pPr algn="ctr"/>
+            <a:endParaRPr lang="zh-CN" altLang="en-US"/>
+          </a:p>
+        </p:txBody>
+      </p:sp>
+      <p:sp>
+        <p:nvSpPr>
+          <p:cNvPr id="5" name="矩形 4">
+            <a:extLst>
+              <a:ext uri="{FF2B5EF4-FFF2-40B4-BE49-F238E27FC236}">
+                <a16:creationId xmlns:a16="http://schemas.microsoft.com/office/drawing/2014/main" id="{9623C181-C1ED-A25F-1DF0-4152D6605723}"/>
+              </a:ext>
+            </a:extLst>
+          </p:cNvPr>
+          <p:cNvSpPr/>
+          <p:nvPr/>
+        </p:nvSpPr>
+        <p:spPr>
+          <a:xfrm>
+            <a:off x="7542829" y="487180"/>
+            <a:ext cx="1873956" cy="2573867"/>
+          </a:xfrm>
+          <a:prstGeom prst="rect">
+            <a:avLst/>
+          </a:prstGeom>
+          <a:blipFill>
+            <a:blip r:embed="rId2"/>
+            <a:tile tx="0" ty="0" sx="100000" sy="100000" flip="none" algn="tl"/>
+          </a:blipFill>
+        </p:spPr>
+        <p:style>
+          <a:lnRef idx="2">
+            <a:schemeClr val="accent1">
+              <a:shade val="15000"/>
+            </a:schemeClr>
+          </a:lnRef>
+          <a:fillRef idx="1">
+            <a:schemeClr val="accent1"/>
+          </a:fillRef>
+          <a:effectRef idx="0">
+            <a:schemeClr val="accent1"/>
+          </a:effectRef>
+          <a:fontRef idx="minor">
+            <a:schemeClr val="lt1"/>
+          </a:fontRef>
+        </p:style>
+        <p:txBody>
+          <a:bodyPr rtlCol="0" anchor="ctr"/>
+          <a:lstStyle/>
+          <a:p>
+            <a:pPr algn="ctr"/>
+            <a:endParaRPr lang="zh-CN" altLang="en-US"/>
+          </a:p>
+        </p:txBody>
+      </p:sp>
+      <p:sp>
+        <p:nvSpPr>
+          <p:cNvPr id="6" name="矩形 5">
+            <a:extLst>
+              <a:ext uri="{FF2B5EF4-FFF2-40B4-BE49-F238E27FC236}">
+                <a16:creationId xmlns:a16="http://schemas.microsoft.com/office/drawing/2014/main" id="{F16085DD-2F2D-AFE5-EC91-05970A94617C}"/>
+              </a:ext>
+            </a:extLst>
+          </p:cNvPr>
+          <p:cNvSpPr/>
+          <p:nvPr/>
+        </p:nvSpPr>
+        <p:spPr>
+          <a:xfrm>
+            <a:off x="9907852" y="487176"/>
+            <a:ext cx="1873956" cy="2573867"/>
+          </a:xfrm>
+          <a:prstGeom prst="rect">
+            <a:avLst/>
+          </a:prstGeom>
+          <a:blipFill>
+            <a:blip r:embed="rId3"/>
+            <a:stretch>
+              <a:fillRect/>
+            </a:stretch>
+          </a:blipFill>
+        </p:spPr>
+        <p:style>
+          <a:lnRef idx="2">
+            <a:schemeClr val="accent1">
+              <a:shade val="15000"/>
+            </a:schemeClr>
+          </a:lnRef>
+          <a:fillRef idx="1">
+            <a:schemeClr val="accent1"/>
+          </a:fillRef>
+          <a:effectRef idx="0">
+            <a:schemeClr val="accent1"/>
+          </a:effectRef>
+          <a:fontRef idx="minor">
+            <a:schemeClr val="lt1"/>
+          </a:fontRef>
+        </p:style>
+        <p:txBody>
+          <a:bodyPr rtlCol="0" anchor="ctr"/>
+          <a:lstStyle/>
+          <a:p>
+            <a:pPr algn="ctr"/>
+            <a:endParaRPr lang="zh-CN" altLang="en-US"/>
+          </a:p>
+        </p:txBody>
+      </p:sp>
+      <p:sp>
+        <p:nvSpPr>
+          <p:cNvPr id="10" name="矩形 9">
+            <a:extLst>
+              <a:ext uri="{FF2B5EF4-FFF2-40B4-BE49-F238E27FC236}">
+                <a16:creationId xmlns:a16="http://schemas.microsoft.com/office/drawing/2014/main" id="{8FF948D3-96B5-7D37-CD6E-2E07832FA4C7}"/>
+              </a:ext>
+            </a:extLst>
+          </p:cNvPr>
+          <p:cNvSpPr/>
+          <p:nvPr/>
+        </p:nvSpPr>
+        <p:spPr>
+          <a:xfrm>
+            <a:off x="447758" y="3796957"/>
+            <a:ext cx="1873956" cy="2573867"/>
+          </a:xfrm>
+          <a:prstGeom prst="rect">
+            <a:avLst/>
+          </a:prstGeom>
+          <a:pattFill prst="horzBrick">
+            <a:fgClr>
+              <a:schemeClr val="accent1"/>
+            </a:fgClr>
+            <a:bgClr>
+              <a:schemeClr val="bg1"/>
+            </a:bgClr>
+          </a:pattFill>
+        </p:spPr>
+        <p:style>
+          <a:lnRef idx="2">
+            <a:schemeClr val="accent1">
+              <a:shade val="15000"/>
+            </a:schemeClr>
+          </a:lnRef>
+          <a:fillRef idx="1">
+            <a:schemeClr val="accent1"/>
+          </a:fillRef>
+          <a:effectRef idx="0">
+            <a:schemeClr val="accent1"/>
+          </a:effectRef>
+          <a:fontRef idx="minor">
+            <a:schemeClr val="lt1"/>
+          </a:fontRef>
+        </p:style>
+        <p:txBody>
+          <a:bodyPr rtlCol="0" anchor="ctr"/>
+          <a:lstStyle/>
+          <a:p>
+            <a:pPr algn="ctr"/>
+            <a:endParaRPr lang="zh-CN" altLang="en-US"/>
+          </a:p>
+        </p:txBody>
+      </p:sp>
+      <p:sp useBgFill="1">
+        <p:nvSpPr>
+          <p:cNvPr id="11" name="矩形 10">
+            <a:extLst>
+              <a:ext uri="{FF2B5EF4-FFF2-40B4-BE49-F238E27FC236}">
+                <a16:creationId xmlns:a16="http://schemas.microsoft.com/office/drawing/2014/main" id="{508EA8B6-3599-9D48-4A53-A46A3B293641}"/>
+              </a:ext>
+            </a:extLst>
+          </p:cNvPr>
+          <p:cNvSpPr/>
+          <p:nvPr/>
+        </p:nvSpPr>
+        <p:spPr>
+          <a:xfrm>
+            <a:off x="2812782" y="3796956"/>
+            <a:ext cx="1873956" cy="2573867"/>
+          </a:xfrm>
+          <a:prstGeom prst="rect">
             <a:avLst/>
           </a:prstGeom>
         </p:spPr>

</xml_diff>